<commit_message>
7-27 ppt & hyperparameters search
</commit_message>
<xml_diff>
--- a/组会7-26改.pptx
+++ b/组会7-26改.pptx
@@ -20,6 +20,7 @@
     <p:sldId id="263" r:id="rId13"/>
     <p:sldId id="262" r:id="rId14"/>
     <p:sldId id="268" r:id="rId15"/>
+    <p:sldId id="280" r:id="rId16"/>
   </p:sldIdLst>
   <p:sldSz cx="12192000" cy="6858000"/>
   <p:notesSz cx="6858000" cy="9144000"/>
@@ -4110,6 +4111,144 @@
 </p:sld>
 </file>
 
+<file path=ppt/slides/slide13.xml><?xml version="1.0" encoding="utf-8"?>
+<p:sld xmlns:a="http://schemas.openxmlformats.org/drawingml/2006/main" xmlns:r="http://schemas.openxmlformats.org/officeDocument/2006/relationships" xmlns:p="http://schemas.openxmlformats.org/presentationml/2006/main">
+  <p:cSld>
+    <p:spTree>
+      <p:nvGrpSpPr>
+        <p:cNvPr id="1" name=""/>
+        <p:cNvGrpSpPr/>
+        <p:nvPr/>
+      </p:nvGrpSpPr>
+      <p:grpSpPr/>
+      <p:sp>
+        <p:nvSpPr>
+          <p:cNvPr id="2" name="标题 1"/>
+          <p:cNvSpPr>
+            <a:spLocks noGrp="1"/>
+          </p:cNvSpPr>
+          <p:nvPr>
+            <p:ph type="title"/>
+          </p:nvPr>
+        </p:nvSpPr>
+        <p:spPr/>
+        <p:txBody>
+          <a:bodyPr/>
+          <a:p>
+            <a:r>
+              <a:rPr lang="zh-CN" altLang="en-US"/>
+              <a:t>本</a:t>
+            </a:r>
+            <a:r>
+              <a:rPr lang="zh-CN" altLang="en-US"/>
+              <a:t>周工作</a:t>
+            </a:r>
+            <a:endParaRPr lang="zh-CN" altLang="en-US"/>
+          </a:p>
+        </p:txBody>
+      </p:sp>
+      <p:sp>
+        <p:nvSpPr>
+          <p:cNvPr id="10" name="文本框 9"/>
+          <p:cNvSpPr txBox="1"/>
+          <p:nvPr/>
+        </p:nvSpPr>
+        <p:spPr>
+          <a:xfrm>
+            <a:off x="838200" y="1911350"/>
+            <a:ext cx="10515600" cy="1568450"/>
+          </a:xfrm>
+          <a:prstGeom prst="rect">
+            <a:avLst/>
+          </a:prstGeom>
+          <a:noFill/>
+        </p:spPr>
+        <p:txBody>
+          <a:bodyPr wrap="square" rtlCol="0">
+            <a:spAutoFit/>
+          </a:bodyPr>
+          <a:p>
+            <a:pPr algn="l"/>
+            <a:r>
+              <a:rPr lang="en-US" altLang="zh-CN" sz="2400"/>
+              <a:t>a)</a:t>
+            </a:r>
+            <a:r>
+              <a:rPr lang="zh-CN" altLang="en-US" sz="2400"/>
+              <a:t>整理模型结构（</a:t>
+            </a:r>
+            <a:r>
+              <a:rPr lang="en-US" altLang="zh-CN" sz="2400"/>
+              <a:t>space-AttCRISPR</a:t>
+            </a:r>
+            <a:r>
+              <a:rPr lang="zh-CN" altLang="en-US" sz="2400"/>
+              <a:t>与</a:t>
+            </a:r>
+            <a:r>
+              <a:rPr lang="en-US" altLang="zh-CN" sz="2400"/>
+              <a:t>time-AttCRISPR</a:t>
+            </a:r>
+            <a:r>
+              <a:rPr lang="zh-CN" altLang="en-US" sz="2400"/>
+              <a:t>）</a:t>
+            </a:r>
+            <a:endParaRPr lang="zh-CN" altLang="en-US" sz="2400"/>
+          </a:p>
+          <a:p>
+            <a:pPr algn="l"/>
+            <a:r>
+              <a:rPr lang="en-US" altLang="zh-CN" sz="2400"/>
+              <a:t>b)</a:t>
+            </a:r>
+            <a:r>
+              <a:rPr lang="zh-CN" altLang="en-US" sz="2400"/>
+              <a:t>完成计算可解释性的脚本</a:t>
+            </a:r>
+            <a:endParaRPr lang="zh-CN" altLang="en-US" sz="2400"/>
+          </a:p>
+          <a:p>
+            <a:pPr algn="l"/>
+            <a:r>
+              <a:rPr lang="en-US" altLang="zh-CN" sz="2400"/>
+              <a:t>c</a:t>
+            </a:r>
+            <a:r>
+              <a:rPr lang="en-US" altLang="zh-CN" sz="2400"/>
+              <a:t>)</a:t>
+            </a:r>
+            <a:r>
+              <a:rPr lang="zh-CN" altLang="en-US" sz="2400"/>
+              <a:t>提交超参空间搜索任务</a:t>
+            </a:r>
+            <a:endParaRPr lang="zh-CN" altLang="en-US" sz="2400"/>
+          </a:p>
+          <a:p>
+            <a:pPr algn="l"/>
+            <a:r>
+              <a:rPr lang="en-US" altLang="zh-CN" sz="2400"/>
+              <a:t>d)</a:t>
+            </a:r>
+            <a:r>
+              <a:rPr lang="zh-CN" altLang="en-US" sz="2400"/>
+              <a:t>确定模型</a:t>
+            </a:r>
+            <a:r>
+              <a:rPr lang="en-US" altLang="zh-CN" sz="2400"/>
+              <a:t>baseline</a:t>
+            </a:r>
+            <a:endParaRPr lang="en-US" altLang="zh-CN" sz="2400"/>
+          </a:p>
+        </p:txBody>
+      </p:sp>
+    </p:spTree>
+  </p:cSld>
+  <p:clrMapOvr>
+    <a:masterClrMapping/>
+  </p:clrMapOvr>
+</p:sld>
+</file>
+
 <file path=ppt/slides/slide2.xml><?xml version="1.0" encoding="utf-8"?>
 <p:sld xmlns:a="http://schemas.openxmlformats.org/drawingml/2006/main" xmlns:r="http://schemas.openxmlformats.org/officeDocument/2006/relationships" xmlns:p="http://schemas.openxmlformats.org/presentationml/2006/main">
   <p:cSld>
@@ -4201,7 +4340,19 @@
               <a:rPr lang="zh-CN" altLang="en-US">
                 <a:sym typeface="+mn-ea"/>
               </a:rPr>
-              <a:t>预测从空间域学习序列特征，</a:t>
+              <a:t>预测从空间域学习序列特征（</a:t>
+            </a:r>
+            <a:r>
+              <a:rPr lang="en-US" altLang="zh-CN">
+                <a:sym typeface="+mn-ea"/>
+              </a:rPr>
+              <a:t>CNN</a:t>
+            </a:r>
+            <a:r>
+              <a:rPr lang="zh-CN" altLang="en-US">
+                <a:sym typeface="+mn-ea"/>
+              </a:rPr>
+              <a:t>），</a:t>
             </a:r>
             <a:r>
               <a:rPr lang="en-US" altLang="zh-CN">
@@ -4213,7 +4364,19 @@
               <a:rPr lang="zh-CN" altLang="en-US">
                 <a:sym typeface="+mn-ea"/>
               </a:rPr>
-              <a:t>预测从时间域学习序列特征不同，AttCRISPR拥有多层输入</a:t>
+              <a:t>预测从时间域学习序列特征（</a:t>
+            </a:r>
+            <a:r>
+              <a:rPr lang="en-US" altLang="zh-CN">
+                <a:sym typeface="+mn-ea"/>
+              </a:rPr>
+              <a:t>RNN</a:t>
+            </a:r>
+            <a:r>
+              <a:rPr lang="zh-CN" altLang="en-US">
+                <a:sym typeface="+mn-ea"/>
+              </a:rPr>
+              <a:t>）不同，AttCRISPR拥有多层输入</a:t>
             </a:r>
             <a:r>
               <a:rPr lang="zh-CN" altLang="en-US"/>
@@ -6861,7 +7024,7 @@
         <p:spPr>
           <a:xfrm>
             <a:off x="2619375" y="6190615"/>
-            <a:ext cx="8041640" cy="368300"/>
+            <a:ext cx="8065135" cy="368300"/>
           </a:xfrm>
           <a:prstGeom prst="rect">
             <a:avLst/>
@@ -6879,7 +7042,7 @@
             </a:r>
             <a:r>
               <a:rPr lang="en-US" altLang="zh-CN"/>
-              <a:t>nc</a:t>
+              <a:t>nb</a:t>
             </a:r>
             <a:r>
               <a:rPr lang="zh-CN" altLang="en-US"/>

</xml_diff>